<commit_message>
vault upate: 2024-01-06 16:43
</commit_message>
<xml_diff>
--- a/assets/tistory/thumbnail/_thumbnail-creator.pptx
+++ b/assets/tistory/thumbnail/_thumbnail-creator.pptx
@@ -3390,10 +3390,10 @@
       </p:sp>
       <p:pic>
         <p:nvPicPr>
-          <p:cNvPr id="1026" name="Picture 2" descr="post-thumbnail">
-            <a:extLst>
-              <a:ext uri="{FF2B5EF4-FFF2-40B4-BE49-F238E27FC236}">
-                <a16:creationId xmlns:a16="http://schemas.microsoft.com/office/drawing/2014/main" id="{4BC75376-8197-EBC4-4CBD-239F5824324D}"/>
+          <p:cNvPr id="1040" name="Picture 16" descr="Interview Icon Style 7241534 Vector Art at Vecteezy">
+            <a:extLst>
+              <a:ext uri="{FF2B5EF4-FFF2-40B4-BE49-F238E27FC236}">
+                <a16:creationId xmlns:a16="http://schemas.microsoft.com/office/drawing/2014/main" id="{CE3461B2-04D3-DD42-1C41-8CFFBE2ACECA}"/>
               </a:ext>
             </a:extLst>
           </p:cNvPr>
@@ -3405,23 +3405,6 @@
         <p:blipFill>
           <a:blip r:embed="rId2">
             <a:extLst>
-              <a:ext uri="{BEBA8EAE-BF5A-486C-A8C5-ECC9F3942E4B}">
-                <a14:imgProps xmlns:a14="http://schemas.microsoft.com/office/drawing/2010/main">
-                  <a14:imgLayer r:embed="rId3">
-                    <a14:imgEffect>
-                      <a14:backgroundRemoval t="10000" b="90000" l="10000" r="90000">
-                        <a14:foregroundMark x1="33000" y1="55653" x2="33000" y2="55653"/>
-                        <a14:foregroundMark x1="35083" y1="64172" x2="35083" y2="64172"/>
-                        <a14:foregroundMark x1="50500" y1="55653" x2="50500" y2="55653"/>
-                        <a14:foregroundMark x1="54042" y1="53981" x2="54042" y2="53981"/>
-                        <a14:foregroundMark x1="63542" y1="53424" x2="63542" y2="53424"/>
-                        <a14:foregroundMark x1="65875" y1="53424" x2="65875" y2="53424"/>
-                        <a14:foregroundMark x1="74167" y1="52866" x2="74167" y2="52866"/>
-                      </a14:backgroundRemoval>
-                    </a14:imgEffect>
-                  </a14:imgLayer>
-                </a14:imgProps>
-              </a:ext>
               <a:ext uri="{28A0092B-C50C-407E-A947-70E740481C1C}">
                 <a14:useLocalDpi xmlns:a14="http://schemas.microsoft.com/office/drawing/2010/main" val="0"/>
               </a:ext>
@@ -3434,8 +3417,8 @@
         </p:blipFill>
         <p:spPr bwMode="auto">
           <a:xfrm>
-            <a:off x="4417943" y="2550860"/>
-            <a:ext cx="3356113" cy="1756279"/>
+            <a:off x="5377069" y="2710069"/>
+            <a:ext cx="1437861" cy="1437861"/>
           </a:xfrm>
           <a:prstGeom prst="rect">
             <a:avLst/>

</xml_diff>

<commit_message>
vault upate: 2024-01-06 18:36
</commit_message>
<xml_diff>
--- a/assets/tistory/thumbnail/_thumbnail-creator.pptx
+++ b/assets/tistory/thumbnail/_thumbnail-creator.pptx
@@ -3390,49 +3390,32 @@
       </p:sp>
       <p:pic>
         <p:nvPicPr>
-          <p:cNvPr id="1040" name="Picture 16" descr="Interview Icon Style 7241534 Vector Art at Vecteezy">
-            <a:extLst>
-              <a:ext uri="{FF2B5EF4-FFF2-40B4-BE49-F238E27FC236}">
-                <a16:creationId xmlns:a16="http://schemas.microsoft.com/office/drawing/2014/main" id="{CE3461B2-04D3-DD42-1C41-8CFFBE2ACECA}"/>
+          <p:cNvPr id="2" name="그림 1">
+            <a:extLst>
+              <a:ext uri="{FF2B5EF4-FFF2-40B4-BE49-F238E27FC236}">
+                <a16:creationId xmlns:a16="http://schemas.microsoft.com/office/drawing/2014/main" id="{F70E733B-74F8-253F-BDD6-0732FF6986D2}"/>
               </a:ext>
             </a:extLst>
           </p:cNvPr>
           <p:cNvPicPr>
-            <a:picLocks noChangeAspect="1" noChangeArrowheads="1"/>
+            <a:picLocks noChangeAspect="1"/>
           </p:cNvPicPr>
           <p:nvPr/>
         </p:nvPicPr>
         <p:blipFill>
-          <a:blip r:embed="rId2">
-            <a:extLst>
-              <a:ext uri="{28A0092B-C50C-407E-A947-70E740481C1C}">
-                <a14:useLocalDpi xmlns:a14="http://schemas.microsoft.com/office/drawing/2010/main" val="0"/>
-              </a:ext>
-            </a:extLst>
-          </a:blip>
-          <a:srcRect/>
+          <a:blip r:embed="rId2"/>
           <a:stretch>
             <a:fillRect/>
           </a:stretch>
         </p:blipFill>
-        <p:spPr bwMode="auto">
+        <p:spPr>
           <a:xfrm>
-            <a:off x="5377069" y="2710069"/>
-            <a:ext cx="1437861" cy="1437861"/>
+            <a:off x="5623368" y="3012756"/>
+            <a:ext cx="945264" cy="832488"/>
           </a:xfrm>
           <a:prstGeom prst="rect">
             <a:avLst/>
           </a:prstGeom>
-          <a:noFill/>
-          <a:extLst>
-            <a:ext uri="{909E8E84-426E-40DD-AFC4-6F175D3DCCD1}">
-              <a14:hiddenFill xmlns:a14="http://schemas.microsoft.com/office/drawing/2010/main">
-                <a:solidFill>
-                  <a:srgbClr val="FFFFFF"/>
-                </a:solidFill>
-              </a14:hiddenFill>
-            </a:ext>
-          </a:extLst>
         </p:spPr>
       </p:pic>
     </p:spTree>

</xml_diff>